<commit_message>
Check in of Italian translation updates for the Driver Behavior service
</commit_message>
<xml_diff>
--- a/services/nl/it/IotDriverInsights/images/sequence_diagram.pptx
+++ b/services/nl/it/IotDriverInsights/images/sequence_diagram.pptx
@@ -254,7 +254,7 @@
           <a:p>
             <a:fld id="{DE3AD58E-45E1-4C59-9E64-AA667E6AFE1E}" type="datetimeFigureOut">
               <a:rPr kumimoji="1" lang="ja-JP" altLang="en-US" smtClean="0"/>
-              <a:t>2016/6/3</a:t>
+              <a:t>2016/5/9</a:t>
             </a:fld>
             <a:endParaRPr kumimoji="1" lang="ja-JP" altLang="en-US"/>
           </a:p>
@@ -424,7 +424,7 @@
           <a:p>
             <a:fld id="{DE3AD58E-45E1-4C59-9E64-AA667E6AFE1E}" type="datetimeFigureOut">
               <a:rPr kumimoji="1" lang="ja-JP" altLang="en-US" smtClean="0"/>
-              <a:t>2016/6/3</a:t>
+              <a:t>2016/5/9</a:t>
             </a:fld>
             <a:endParaRPr kumimoji="1" lang="ja-JP" altLang="en-US"/>
           </a:p>
@@ -604,7 +604,7 @@
           <a:p>
             <a:fld id="{DE3AD58E-45E1-4C59-9E64-AA667E6AFE1E}" type="datetimeFigureOut">
               <a:rPr kumimoji="1" lang="ja-JP" altLang="en-US" smtClean="0"/>
-              <a:t>2016/6/3</a:t>
+              <a:t>2016/5/9</a:t>
             </a:fld>
             <a:endParaRPr kumimoji="1" lang="ja-JP" altLang="en-US"/>
           </a:p>
@@ -774,7 +774,7 @@
           <a:p>
             <a:fld id="{DE3AD58E-45E1-4C59-9E64-AA667E6AFE1E}" type="datetimeFigureOut">
               <a:rPr kumimoji="1" lang="ja-JP" altLang="en-US" smtClean="0"/>
-              <a:t>2016/6/3</a:t>
+              <a:t>2016/5/9</a:t>
             </a:fld>
             <a:endParaRPr kumimoji="1" lang="ja-JP" altLang="en-US"/>
           </a:p>
@@ -1018,7 +1018,7 @@
           <a:p>
             <a:fld id="{DE3AD58E-45E1-4C59-9E64-AA667E6AFE1E}" type="datetimeFigureOut">
               <a:rPr kumimoji="1" lang="ja-JP" altLang="en-US" smtClean="0"/>
-              <a:t>2016/6/3</a:t>
+              <a:t>2016/5/9</a:t>
             </a:fld>
             <a:endParaRPr kumimoji="1" lang="ja-JP" altLang="en-US"/>
           </a:p>
@@ -1250,7 +1250,7 @@
           <a:p>
             <a:fld id="{DE3AD58E-45E1-4C59-9E64-AA667E6AFE1E}" type="datetimeFigureOut">
               <a:rPr kumimoji="1" lang="ja-JP" altLang="en-US" smtClean="0"/>
-              <a:t>2016/6/3</a:t>
+              <a:t>2016/5/9</a:t>
             </a:fld>
             <a:endParaRPr kumimoji="1" lang="ja-JP" altLang="en-US"/>
           </a:p>
@@ -1617,7 +1617,7 @@
           <a:p>
             <a:fld id="{DE3AD58E-45E1-4C59-9E64-AA667E6AFE1E}" type="datetimeFigureOut">
               <a:rPr kumimoji="1" lang="ja-JP" altLang="en-US" smtClean="0"/>
-              <a:t>2016/6/3</a:t>
+              <a:t>2016/5/9</a:t>
             </a:fld>
             <a:endParaRPr kumimoji="1" lang="ja-JP" altLang="en-US"/>
           </a:p>
@@ -1735,7 +1735,7 @@
           <a:p>
             <a:fld id="{DE3AD58E-45E1-4C59-9E64-AA667E6AFE1E}" type="datetimeFigureOut">
               <a:rPr kumimoji="1" lang="ja-JP" altLang="en-US" smtClean="0"/>
-              <a:t>2016/6/3</a:t>
+              <a:t>2016/5/9</a:t>
             </a:fld>
             <a:endParaRPr kumimoji="1" lang="ja-JP" altLang="en-US"/>
           </a:p>
@@ -1830,7 +1830,7 @@
           <a:p>
             <a:fld id="{DE3AD58E-45E1-4C59-9E64-AA667E6AFE1E}" type="datetimeFigureOut">
               <a:rPr kumimoji="1" lang="ja-JP" altLang="en-US" smtClean="0"/>
-              <a:t>2016/6/3</a:t>
+              <a:t>2016/5/9</a:t>
             </a:fld>
             <a:endParaRPr kumimoji="1" lang="ja-JP" altLang="en-US"/>
           </a:p>
@@ -2107,7 +2107,7 @@
           <a:p>
             <a:fld id="{DE3AD58E-45E1-4C59-9E64-AA667E6AFE1E}" type="datetimeFigureOut">
               <a:rPr kumimoji="1" lang="ja-JP" altLang="en-US" smtClean="0"/>
-              <a:t>2016/6/3</a:t>
+              <a:t>2016/5/9</a:t>
             </a:fld>
             <a:endParaRPr kumimoji="1" lang="ja-JP" altLang="en-US"/>
           </a:p>
@@ -2364,7 +2364,7 @@
           <a:p>
             <a:fld id="{DE3AD58E-45E1-4C59-9E64-AA667E6AFE1E}" type="datetimeFigureOut">
               <a:rPr kumimoji="1" lang="ja-JP" altLang="en-US" smtClean="0"/>
-              <a:t>2016/6/3</a:t>
+              <a:t>2016/5/9</a:t>
             </a:fld>
             <a:endParaRPr kumimoji="1" lang="ja-JP" altLang="en-US"/>
           </a:p>
@@ -2577,7 +2577,7 @@
           <a:p>
             <a:fld id="{DE3AD58E-45E1-4C59-9E64-AA667E6AFE1E}" type="datetimeFigureOut">
               <a:rPr kumimoji="1" lang="ja-JP" altLang="en-US" smtClean="0"/>
-              <a:t>2016/6/3</a:t>
+              <a:t>2016/5/9</a:t>
             </a:fld>
             <a:endParaRPr kumimoji="1" lang="ja-JP" altLang="en-US"/>
           </a:p>
@@ -3594,7 +3594,7 @@
                 <a:rPr lang="en-US" altLang="ja-JP" sz="600" dirty="0" smtClean="0">
                   <a:latin typeface="Arial" charset="0"/>
                 </a:rPr>
-                <a:t>Dati di analisi vettura</a:t>
+                <a:t>Dati di analisi autoveicoli</a:t>
               </a:r>
               <a:endParaRPr lang="ja-JP" altLang="en-US" sz="600" dirty="0">
                 <a:latin typeface="Arial" charset="0"/>
@@ -3666,7 +3666,7 @@
                 <a:rPr lang="en-US" altLang="ja-JP" sz="600" dirty="0" smtClean="0">
                   <a:latin typeface="Arial" charset="0"/>
                 </a:rPr>
-                <a:t>Associa dati di analisi vettura messi in corrispondenza</a:t>
+                <a:t>Associa dati di analisi autoveicoli messi in corrispondenza</a:t>
               </a:r>
               <a:endParaRPr lang="ja-JP" altLang="en-US" sz="600" dirty="0">
                 <a:latin typeface="Arial" charset="0"/>
@@ -4109,7 +4109,7 @@
                 <a:rPr lang="en-US" altLang="ja-JP" sz="600" dirty="0" smtClean="0">
                   <a:latin typeface="Arial" charset="0"/>
                 </a:rPr>
-                <a:t>Associa dati di analisi vettura messi in corrispondenza, tipo di strada</a:t>
+                <a:t>Associa dati di analisi autoveicoli messi in corrispondenza, tipo di strada</a:t>
               </a:r>
               <a:endParaRPr lang="ja-JP" altLang="en-US" sz="600" dirty="0">
                 <a:latin typeface="Arial" charset="0"/>

</xml_diff>